<commit_message>
Separate to CXF and JDK
</commit_message>
<xml_diff>
--- a/images/material.pptx
+++ b/images/material.pptx
@@ -6,6 +6,7 @@
   </p:sldMasterIdLst>
   <p:sldIdLst>
     <p:sldId id="256" r:id="rId2"/>
+    <p:sldId id="257" r:id="rId3"/>
   </p:sldIdLst>
   <p:sldSz cx="9144000" cy="6858000" type="screen4x3"/>
   <p:notesSz cx="6858000" cy="9144000"/>
@@ -288,7 +289,7 @@
           <a:p>
             <a:fld id="{62E7979B-FB14-BC43-8173-40591443F091}" type="datetimeFigureOut">
               <a:rPr kumimoji="1" lang="ja-JP" altLang="en-US" smtClean="0"/>
-              <a:t>15/05/29</a:t>
+              <a:t>15/05/30</a:t>
             </a:fld>
             <a:endParaRPr kumimoji="1" lang="ja-JP" altLang="en-US"/>
           </a:p>
@@ -490,7 +491,7 @@
           <a:p>
             <a:fld id="{62E7979B-FB14-BC43-8173-40591443F091}" type="datetimeFigureOut">
               <a:rPr kumimoji="1" lang="ja-JP" altLang="en-US" smtClean="0"/>
-              <a:t>15/05/29</a:t>
+              <a:t>15/05/30</a:t>
             </a:fld>
             <a:endParaRPr kumimoji="1" lang="ja-JP" altLang="en-US"/>
           </a:p>
@@ -702,7 +703,7 @@
           <a:p>
             <a:fld id="{62E7979B-FB14-BC43-8173-40591443F091}" type="datetimeFigureOut">
               <a:rPr kumimoji="1" lang="ja-JP" altLang="en-US" smtClean="0"/>
-              <a:t>15/05/29</a:t>
+              <a:t>15/05/30</a:t>
             </a:fld>
             <a:endParaRPr kumimoji="1" lang="ja-JP" altLang="en-US"/>
           </a:p>
@@ -904,7 +905,7 @@
           <a:p>
             <a:fld id="{62E7979B-FB14-BC43-8173-40591443F091}" type="datetimeFigureOut">
               <a:rPr kumimoji="1" lang="ja-JP" altLang="en-US" smtClean="0"/>
-              <a:t>15/05/29</a:t>
+              <a:t>15/05/30</a:t>
             </a:fld>
             <a:endParaRPr kumimoji="1" lang="ja-JP" altLang="en-US"/>
           </a:p>
@@ -1150,7 +1151,7 @@
           <a:p>
             <a:fld id="{62E7979B-FB14-BC43-8173-40591443F091}" type="datetimeFigureOut">
               <a:rPr kumimoji="1" lang="ja-JP" altLang="en-US" smtClean="0"/>
-              <a:t>15/05/29</a:t>
+              <a:t>15/05/30</a:t>
             </a:fld>
             <a:endParaRPr kumimoji="1" lang="ja-JP" altLang="en-US"/>
           </a:p>
@@ -1502,7 +1503,7 @@
           <a:p>
             <a:fld id="{62E7979B-FB14-BC43-8173-40591443F091}" type="datetimeFigureOut">
               <a:rPr kumimoji="1" lang="ja-JP" altLang="en-US" smtClean="0"/>
-              <a:t>15/05/29</a:t>
+              <a:t>15/05/30</a:t>
             </a:fld>
             <a:endParaRPr kumimoji="1" lang="ja-JP" altLang="en-US"/>
           </a:p>
@@ -1988,7 +1989,7 @@
           <a:p>
             <a:fld id="{62E7979B-FB14-BC43-8173-40591443F091}" type="datetimeFigureOut">
               <a:rPr kumimoji="1" lang="ja-JP" altLang="en-US" smtClean="0"/>
-              <a:t>15/05/29</a:t>
+              <a:t>15/05/30</a:t>
             </a:fld>
             <a:endParaRPr kumimoji="1" lang="ja-JP" altLang="en-US"/>
           </a:p>
@@ -2106,7 +2107,7 @@
           <a:p>
             <a:fld id="{62E7979B-FB14-BC43-8173-40591443F091}" type="datetimeFigureOut">
               <a:rPr kumimoji="1" lang="ja-JP" altLang="en-US" smtClean="0"/>
-              <a:t>15/05/29</a:t>
+              <a:t>15/05/30</a:t>
             </a:fld>
             <a:endParaRPr kumimoji="1" lang="ja-JP" altLang="en-US"/>
           </a:p>
@@ -2201,7 +2202,7 @@
           <a:p>
             <a:fld id="{62E7979B-FB14-BC43-8173-40591443F091}" type="datetimeFigureOut">
               <a:rPr kumimoji="1" lang="ja-JP" altLang="en-US" smtClean="0"/>
-              <a:t>15/05/29</a:t>
+              <a:t>15/05/30</a:t>
             </a:fld>
             <a:endParaRPr kumimoji="1" lang="ja-JP" altLang="en-US"/>
           </a:p>
@@ -2510,7 +2511,7 @@
           <a:p>
             <a:fld id="{62E7979B-FB14-BC43-8173-40591443F091}" type="datetimeFigureOut">
               <a:rPr kumimoji="1" lang="ja-JP" altLang="en-US" smtClean="0"/>
-              <a:t>15/05/29</a:t>
+              <a:t>15/05/30</a:t>
             </a:fld>
             <a:endParaRPr kumimoji="1" lang="ja-JP" altLang="en-US"/>
           </a:p>
@@ -2763,7 +2764,7 @@
           <a:p>
             <a:fld id="{62E7979B-FB14-BC43-8173-40591443F091}" type="datetimeFigureOut">
               <a:rPr kumimoji="1" lang="ja-JP" altLang="en-US" smtClean="0"/>
-              <a:t>15/05/29</a:t>
+              <a:t>15/05/30</a:t>
             </a:fld>
             <a:endParaRPr kumimoji="1" lang="ja-JP" altLang="en-US"/>
           </a:p>
@@ -3008,7 +3009,7 @@
           <a:p>
             <a:fld id="{62E7979B-FB14-BC43-8173-40591443F091}" type="datetimeFigureOut">
               <a:rPr kumimoji="1" lang="ja-JP" altLang="en-US" smtClean="0"/>
-              <a:t>15/05/29</a:t>
+              <a:t>15/05/30</a:t>
             </a:fld>
             <a:endParaRPr kumimoji="1" lang="ja-JP" altLang="en-US"/>
           </a:p>
@@ -4213,12 +4214,6 @@
               </a:rPr>
               <a:t>@Around</a:t>
             </a:r>
-            <a:endParaRPr lang="en-US" altLang="ja-JP" sz="1200" u="sng" dirty="0" smtClean="0">
-              <a:solidFill>
-                <a:srgbClr val="404040"/>
-              </a:solidFill>
-              <a:effectLst/>
-            </a:endParaRPr>
           </a:p>
           <a:p>
             <a:pPr algn="ctr"/>
@@ -4516,12 +4511,6 @@
               </a:rPr>
               <a:t>@Around</a:t>
             </a:r>
-            <a:endParaRPr lang="en-US" altLang="ja-JP" sz="1200" u="sng" dirty="0" smtClean="0">
-              <a:solidFill>
-                <a:srgbClr val="404040"/>
-              </a:solidFill>
-              <a:effectLst/>
-            </a:endParaRPr>
           </a:p>
           <a:p>
             <a:pPr algn="ctr"/>
@@ -5516,12 +5505,6 @@
               </a:rPr>
               <a:t>@Around</a:t>
             </a:r>
-            <a:endParaRPr lang="en-US" altLang="ja-JP" sz="1200" u="sng" dirty="0" smtClean="0">
-              <a:solidFill>
-                <a:srgbClr val="404040"/>
-              </a:solidFill>
-              <a:effectLst/>
-            </a:endParaRPr>
           </a:p>
           <a:p>
             <a:pPr algn="ctr"/>
@@ -5690,6 +5673,1857 @@
     <p:extLst>
       <p:ext uri="{BB962C8B-B14F-4D97-AF65-F5344CB8AC3E}">
         <p14:creationId xmlns:p14="http://schemas.microsoft.com/office/powerpoint/2010/main" val="3599673719"/>
+      </p:ext>
+    </p:extLst>
+  </p:cSld>
+  <p:clrMapOvr>
+    <a:masterClrMapping/>
+  </p:clrMapOvr>
+</p:sld>
+</file>
+
+<file path=ppt/slides/slide2.xml><?xml version="1.0" encoding="utf-8"?>
+<p:sld xmlns:a="http://schemas.openxmlformats.org/drawingml/2006/main" xmlns:r="http://schemas.openxmlformats.org/officeDocument/2006/relationships" xmlns:p="http://schemas.openxmlformats.org/presentationml/2006/main">
+  <p:cSld>
+    <p:spTree>
+      <p:nvGrpSpPr>
+        <p:cNvPr id="1" name=""/>
+        <p:cNvGrpSpPr/>
+        <p:nvPr/>
+      </p:nvGrpSpPr>
+      <p:grpSpPr>
+        <a:xfrm>
+          <a:off x="0" y="0"/>
+          <a:ext cx="0" cy="0"/>
+          <a:chOff x="0" y="0"/>
+          <a:chExt cx="0" cy="0"/>
+        </a:xfrm>
+      </p:grpSpPr>
+      <p:sp>
+        <p:nvSpPr>
+          <p:cNvPr id="86" name="正方形/長方形 85"/>
+          <p:cNvSpPr/>
+          <p:nvPr/>
+        </p:nvSpPr>
+        <p:spPr>
+          <a:xfrm>
+            <a:off x="1802188" y="168093"/>
+            <a:ext cx="8290748" cy="7422732"/>
+          </a:xfrm>
+          <a:prstGeom prst="rect">
+            <a:avLst/>
+          </a:prstGeom>
+          <a:solidFill>
+            <a:srgbClr val="EBF1DE"/>
+          </a:solidFill>
+          <a:ln w="38100" cmpd="dbl">
+            <a:noFill/>
+            <a:prstDash val="solid"/>
+          </a:ln>
+        </p:spPr>
+        <p:style>
+          <a:lnRef idx="2">
+            <a:schemeClr val="accent3">
+              <a:shade val="50000"/>
+            </a:schemeClr>
+          </a:lnRef>
+          <a:fillRef idx="1">
+            <a:schemeClr val="accent3"/>
+          </a:fillRef>
+          <a:effectRef idx="0">
+            <a:schemeClr val="accent3"/>
+          </a:effectRef>
+          <a:fontRef idx="minor">
+            <a:schemeClr val="lt1"/>
+          </a:fontRef>
+        </p:style>
+        <p:txBody>
+          <a:bodyPr rtlCol="0" anchor="b" anchorCtr="0"/>
+          <a:lstStyle/>
+          <a:p>
+            <a:pPr algn="ctr"/>
+            <a:r>
+              <a:rPr lang="en-US" altLang="ja-JP" sz="2400" dirty="0" smtClean="0">
+                <a:solidFill>
+                  <a:schemeClr val="accent3">
+                    <a:lumMod val="50000"/>
+                  </a:schemeClr>
+                </a:solidFill>
+              </a:rPr>
+              <a:t>Spring </a:t>
+            </a:r>
+            <a:r>
+              <a:rPr lang="en-US" altLang="ja-JP" sz="2400" dirty="0" err="1" smtClean="0">
+                <a:solidFill>
+                  <a:schemeClr val="accent3">
+                    <a:lumMod val="50000"/>
+                  </a:schemeClr>
+                </a:solidFill>
+              </a:rPr>
+              <a:t>IoC</a:t>
+            </a:r>
+            <a:r>
+              <a:rPr lang="en-US" altLang="ja-JP" sz="2400" dirty="0" smtClean="0">
+                <a:solidFill>
+                  <a:schemeClr val="accent3">
+                    <a:lumMod val="50000"/>
+                  </a:schemeClr>
+                </a:solidFill>
+              </a:rPr>
+              <a:t> Container </a:t>
+            </a:r>
+          </a:p>
+          <a:p>
+            <a:pPr algn="ctr"/>
+            <a:r>
+              <a:rPr lang="en-US" altLang="ja-JP" sz="2400" dirty="0" smtClean="0">
+                <a:solidFill>
+                  <a:schemeClr val="accent3">
+                    <a:lumMod val="50000"/>
+                  </a:schemeClr>
+                </a:solidFill>
+              </a:rPr>
+              <a:t>(for web application)</a:t>
+            </a:r>
+            <a:endParaRPr kumimoji="1" lang="ja-JP" altLang="en-US" sz="2400" dirty="0">
+              <a:solidFill>
+                <a:schemeClr val="accent3">
+                  <a:lumMod val="50000"/>
+                </a:schemeClr>
+              </a:solidFill>
+            </a:endParaRPr>
+          </a:p>
+        </p:txBody>
+      </p:sp>
+      <p:sp>
+        <p:nvSpPr>
+          <p:cNvPr id="49" name="正方形/長方形 48"/>
+          <p:cNvSpPr/>
+          <p:nvPr/>
+        </p:nvSpPr>
+        <p:spPr>
+          <a:xfrm>
+            <a:off x="-1327259" y="168094"/>
+            <a:ext cx="2487129" cy="6439265"/>
+          </a:xfrm>
+          <a:prstGeom prst="rect">
+            <a:avLst/>
+          </a:prstGeom>
+          <a:solidFill>
+            <a:schemeClr val="accent3">
+              <a:lumMod val="20000"/>
+              <a:lumOff val="80000"/>
+            </a:schemeClr>
+          </a:solidFill>
+          <a:ln w="0" cmpd="sng">
+            <a:noFill/>
+            <a:prstDash val="solid"/>
+          </a:ln>
+        </p:spPr>
+        <p:style>
+          <a:lnRef idx="2">
+            <a:schemeClr val="accent3">
+              <a:shade val="50000"/>
+            </a:schemeClr>
+          </a:lnRef>
+          <a:fillRef idx="1">
+            <a:schemeClr val="accent3"/>
+          </a:fillRef>
+          <a:effectRef idx="0">
+            <a:schemeClr val="accent3"/>
+          </a:effectRef>
+          <a:fontRef idx="minor">
+            <a:schemeClr val="lt1"/>
+          </a:fontRef>
+        </p:style>
+        <p:txBody>
+          <a:bodyPr rtlCol="0" anchor="t" anchorCtr="0"/>
+          <a:lstStyle/>
+          <a:p>
+            <a:pPr algn="ctr"/>
+            <a:r>
+              <a:rPr lang="en-US" altLang="ja-JP" sz="2400" dirty="0" smtClean="0">
+                <a:solidFill>
+                  <a:schemeClr val="accent3">
+                    <a:lumMod val="50000"/>
+                  </a:schemeClr>
+                </a:solidFill>
+              </a:rPr>
+              <a:t>Spring </a:t>
+            </a:r>
+          </a:p>
+          <a:p>
+            <a:pPr algn="ctr"/>
+            <a:r>
+              <a:rPr lang="en-US" altLang="ja-JP" sz="2400" dirty="0" err="1" smtClean="0">
+                <a:solidFill>
+                  <a:schemeClr val="accent3">
+                    <a:lumMod val="50000"/>
+                  </a:schemeClr>
+                </a:solidFill>
+              </a:rPr>
+              <a:t>IoC</a:t>
+            </a:r>
+            <a:r>
+              <a:rPr lang="en-US" altLang="ja-JP" sz="2400" dirty="0" smtClean="0">
+                <a:solidFill>
+                  <a:schemeClr val="accent3">
+                    <a:lumMod val="50000"/>
+                  </a:schemeClr>
+                </a:solidFill>
+              </a:rPr>
+              <a:t> Container</a:t>
+            </a:r>
+          </a:p>
+        </p:txBody>
+      </p:sp>
+      <p:sp>
+        <p:nvSpPr>
+          <p:cNvPr id="90" name="正方形/長方形 89"/>
+          <p:cNvSpPr/>
+          <p:nvPr/>
+        </p:nvSpPr>
+        <p:spPr>
+          <a:xfrm>
+            <a:off x="-1124985" y="1006297"/>
+            <a:ext cx="2105280" cy="4456777"/>
+          </a:xfrm>
+          <a:prstGeom prst="rect">
+            <a:avLst/>
+          </a:prstGeom>
+        </p:spPr>
+        <p:style>
+          <a:lnRef idx="3">
+            <a:schemeClr val="lt1"/>
+          </a:lnRef>
+          <a:fillRef idx="1">
+            <a:schemeClr val="accent3"/>
+          </a:fillRef>
+          <a:effectRef idx="1">
+            <a:schemeClr val="accent3"/>
+          </a:effectRef>
+          <a:fontRef idx="minor">
+            <a:schemeClr val="lt1"/>
+          </a:fontRef>
+        </p:style>
+        <p:txBody>
+          <a:bodyPr rtlCol="0" anchor="t" anchorCtr="0"/>
+          <a:lstStyle/>
+          <a:p>
+            <a:pPr algn="ctr"/>
+            <a:r>
+              <a:rPr lang="en-US" altLang="ja-JP" dirty="0" smtClean="0"/>
+              <a:t>Proxy using JDK</a:t>
+            </a:r>
+            <a:endParaRPr kumimoji="1" lang="ja-JP" altLang="en-US" dirty="0"/>
+          </a:p>
+        </p:txBody>
+      </p:sp>
+      <p:sp>
+        <p:nvSpPr>
+          <p:cNvPr id="5" name="正方形/長方形 4"/>
+          <p:cNvSpPr/>
+          <p:nvPr/>
+        </p:nvSpPr>
+        <p:spPr>
+          <a:xfrm>
+            <a:off x="4407421" y="1339945"/>
+            <a:ext cx="1213909" cy="933857"/>
+          </a:xfrm>
+          <a:prstGeom prst="rect">
+            <a:avLst/>
+          </a:prstGeom>
+          <a:solidFill>
+            <a:srgbClr val="DCE6F2"/>
+          </a:solidFill>
+        </p:spPr>
+        <p:style>
+          <a:lnRef idx="3">
+            <a:schemeClr val="lt1"/>
+          </a:lnRef>
+          <a:fillRef idx="1">
+            <a:schemeClr val="accent1"/>
+          </a:fillRef>
+          <a:effectRef idx="1">
+            <a:schemeClr val="accent1"/>
+          </a:effectRef>
+          <a:fontRef idx="minor">
+            <a:schemeClr val="lt1"/>
+          </a:fontRef>
+        </p:style>
+        <p:txBody>
+          <a:bodyPr rtlCol="0" anchor="ctr"/>
+          <a:lstStyle/>
+          <a:p>
+            <a:pPr algn="ctr"/>
+            <a:r>
+              <a:rPr lang="en-US" altLang="ja-JP" sz="1200" u="sng" dirty="0" smtClean="0">
+                <a:solidFill>
+                  <a:schemeClr val="tx1">
+                    <a:lumMod val="75000"/>
+                    <a:lumOff val="25000"/>
+                  </a:schemeClr>
+                </a:solidFill>
+              </a:rPr>
+              <a:t>@</a:t>
+            </a:r>
+            <a:r>
+              <a:rPr lang="en-US" altLang="ja-JP" sz="1200" u="sng" dirty="0" err="1" smtClean="0">
+                <a:solidFill>
+                  <a:schemeClr val="tx1">
+                    <a:lumMod val="75000"/>
+                    <a:lumOff val="25000"/>
+                  </a:schemeClr>
+                </a:solidFill>
+              </a:rPr>
+              <a:t>WebService</a:t>
+            </a:r>
+            <a:endParaRPr lang="en-US" altLang="ja-JP" sz="1200" u="sng" dirty="0" smtClean="0">
+              <a:solidFill>
+                <a:schemeClr val="tx1">
+                  <a:lumMod val="75000"/>
+                  <a:lumOff val="25000"/>
+                </a:schemeClr>
+              </a:solidFill>
+            </a:endParaRPr>
+          </a:p>
+          <a:p>
+            <a:pPr algn="ctr"/>
+            <a:endParaRPr lang="en-US" altLang="ja-JP" sz="200" dirty="0" smtClean="0">
+              <a:solidFill>
+                <a:schemeClr val="tx1">
+                  <a:lumMod val="75000"/>
+                  <a:lumOff val="25000"/>
+                </a:schemeClr>
+              </a:solidFill>
+            </a:endParaRPr>
+          </a:p>
+          <a:p>
+            <a:pPr algn="ctr"/>
+            <a:r>
+              <a:rPr lang="en-US" altLang="ja-JP" dirty="0" err="1" smtClean="0">
+                <a:solidFill>
+                  <a:schemeClr val="tx1">
+                    <a:lumMod val="75000"/>
+                    <a:lumOff val="25000"/>
+                  </a:schemeClr>
+                </a:solidFill>
+              </a:rPr>
+              <a:t>TodoWeb</a:t>
+            </a:r>
+            <a:endParaRPr kumimoji="1" lang="ja-JP" altLang="en-US" dirty="0">
+              <a:solidFill>
+                <a:schemeClr val="tx1">
+                  <a:lumMod val="75000"/>
+                  <a:lumOff val="25000"/>
+                </a:schemeClr>
+              </a:solidFill>
+            </a:endParaRPr>
+          </a:p>
+        </p:txBody>
+      </p:sp>
+      <p:sp>
+        <p:nvSpPr>
+          <p:cNvPr id="7" name="正方形/長方形 6"/>
+          <p:cNvSpPr/>
+          <p:nvPr/>
+        </p:nvSpPr>
+        <p:spPr>
+          <a:xfrm>
+            <a:off x="3847154" y="3337162"/>
+            <a:ext cx="5914958" cy="2708214"/>
+          </a:xfrm>
+          <a:prstGeom prst="rect">
+            <a:avLst/>
+          </a:prstGeom>
+        </p:spPr>
+        <p:style>
+          <a:lnRef idx="3">
+            <a:schemeClr val="lt1"/>
+          </a:lnRef>
+          <a:fillRef idx="1">
+            <a:schemeClr val="accent3"/>
+          </a:fillRef>
+          <a:effectRef idx="1">
+            <a:schemeClr val="accent3"/>
+          </a:effectRef>
+          <a:fontRef idx="minor">
+            <a:schemeClr val="lt1"/>
+          </a:fontRef>
+        </p:style>
+        <p:txBody>
+          <a:bodyPr rtlCol="0" anchor="t" anchorCtr="0"/>
+          <a:lstStyle/>
+          <a:p>
+            <a:pPr algn="ctr"/>
+            <a:r>
+              <a:rPr lang="en-US" altLang="ja-JP" dirty="0" smtClean="0"/>
+              <a:t>Proxy using JDK</a:t>
+            </a:r>
+            <a:endParaRPr kumimoji="1" lang="ja-JP" altLang="en-US" dirty="0"/>
+          </a:p>
+        </p:txBody>
+      </p:sp>
+      <p:sp>
+        <p:nvSpPr>
+          <p:cNvPr id="8" name="正方形/長方形 7"/>
+          <p:cNvSpPr/>
+          <p:nvPr/>
+        </p:nvSpPr>
+        <p:spPr>
+          <a:xfrm>
+            <a:off x="8243637" y="4952773"/>
+            <a:ext cx="1316625" cy="877811"/>
+          </a:xfrm>
+          <a:prstGeom prst="rect">
+            <a:avLst/>
+          </a:prstGeom>
+          <a:solidFill>
+            <a:srgbClr val="DCE6F2"/>
+          </a:solidFill>
+        </p:spPr>
+        <p:style>
+          <a:lnRef idx="3">
+            <a:schemeClr val="lt1"/>
+          </a:lnRef>
+          <a:fillRef idx="1">
+            <a:schemeClr val="accent1"/>
+          </a:fillRef>
+          <a:effectRef idx="1">
+            <a:schemeClr val="accent1"/>
+          </a:effectRef>
+          <a:fontRef idx="minor">
+            <a:schemeClr val="lt1"/>
+          </a:fontRef>
+        </p:style>
+        <p:txBody>
+          <a:bodyPr rtlCol="0" anchor="ctr"/>
+          <a:lstStyle/>
+          <a:p>
+            <a:pPr algn="ctr"/>
+            <a:r>
+              <a:rPr lang="en-US" altLang="ja-JP" sz="1200" dirty="0" smtClean="0">
+                <a:solidFill>
+                  <a:schemeClr val="tx1">
+                    <a:lumMod val="75000"/>
+                    <a:lumOff val="25000"/>
+                  </a:schemeClr>
+                </a:solidFill>
+              </a:rPr>
+              <a:t>@Service</a:t>
+            </a:r>
+          </a:p>
+          <a:p>
+            <a:pPr algn="ctr"/>
+            <a:endParaRPr lang="en-US" altLang="ja-JP" sz="200" dirty="0" smtClean="0">
+              <a:solidFill>
+                <a:schemeClr val="tx1">
+                  <a:lumMod val="75000"/>
+                  <a:lumOff val="25000"/>
+                </a:schemeClr>
+              </a:solidFill>
+            </a:endParaRPr>
+          </a:p>
+          <a:p>
+            <a:pPr algn="ctr"/>
+            <a:r>
+              <a:rPr lang="en-US" altLang="ja-JP" dirty="0" err="1" smtClean="0">
+                <a:solidFill>
+                  <a:schemeClr val="tx1">
+                    <a:lumMod val="75000"/>
+                    <a:lumOff val="25000"/>
+                  </a:schemeClr>
+                </a:solidFill>
+              </a:rPr>
+              <a:t>TodoService</a:t>
+            </a:r>
+            <a:endParaRPr lang="en-US" altLang="ja-JP" dirty="0" smtClean="0">
+              <a:solidFill>
+                <a:schemeClr val="tx1">
+                  <a:lumMod val="75000"/>
+                  <a:lumOff val="25000"/>
+                </a:schemeClr>
+              </a:solidFill>
+            </a:endParaRPr>
+          </a:p>
+          <a:p>
+            <a:pPr algn="ctr"/>
+            <a:r>
+              <a:rPr kumimoji="1" lang="en-US" altLang="ja-JP" dirty="0" err="1" smtClean="0">
+                <a:solidFill>
+                  <a:schemeClr val="tx1">
+                    <a:lumMod val="75000"/>
+                    <a:lumOff val="25000"/>
+                  </a:schemeClr>
+                </a:solidFill>
+              </a:rPr>
+              <a:t>Impl</a:t>
+            </a:r>
+            <a:endParaRPr kumimoji="1" lang="ja-JP" altLang="en-US" dirty="0">
+              <a:solidFill>
+                <a:schemeClr val="tx1">
+                  <a:lumMod val="75000"/>
+                  <a:lumOff val="25000"/>
+                </a:schemeClr>
+              </a:solidFill>
+            </a:endParaRPr>
+          </a:p>
+        </p:txBody>
+      </p:sp>
+      <p:sp>
+        <p:nvSpPr>
+          <p:cNvPr id="14" name="正方形/長方形 13"/>
+          <p:cNvSpPr/>
+          <p:nvPr/>
+        </p:nvSpPr>
+        <p:spPr>
+          <a:xfrm>
+            <a:off x="4286027" y="4121227"/>
+            <a:ext cx="3387995" cy="1486477"/>
+          </a:xfrm>
+          <a:prstGeom prst="rect">
+            <a:avLst/>
+          </a:prstGeom>
+          <a:solidFill>
+            <a:schemeClr val="accent3">
+              <a:lumMod val="60000"/>
+              <a:lumOff val="40000"/>
+            </a:schemeClr>
+          </a:solidFill>
+        </p:spPr>
+        <p:style>
+          <a:lnRef idx="3">
+            <a:schemeClr val="lt1"/>
+          </a:lnRef>
+          <a:fillRef idx="1">
+            <a:schemeClr val="accent1"/>
+          </a:fillRef>
+          <a:effectRef idx="1">
+            <a:schemeClr val="accent1"/>
+          </a:effectRef>
+          <a:fontRef idx="minor">
+            <a:schemeClr val="lt1"/>
+          </a:fontRef>
+        </p:style>
+        <p:txBody>
+          <a:bodyPr rtlCol="0" anchor="t" anchorCtr="0"/>
+          <a:lstStyle/>
+          <a:p>
+            <a:pPr algn="ctr"/>
+            <a:r>
+              <a:rPr lang="en-US" altLang="ja-JP" dirty="0" smtClean="0">
+                <a:solidFill>
+                  <a:srgbClr val="404040"/>
+                </a:solidFill>
+              </a:rPr>
+              <a:t>Spring AOP</a:t>
+            </a:r>
+            <a:endParaRPr kumimoji="1" lang="ja-JP" altLang="en-US" dirty="0">
+              <a:solidFill>
+                <a:srgbClr val="404040"/>
+              </a:solidFill>
+            </a:endParaRPr>
+          </a:p>
+        </p:txBody>
+      </p:sp>
+      <p:sp>
+        <p:nvSpPr>
+          <p:cNvPr id="15" name="正方形/長方形 14"/>
+          <p:cNvSpPr/>
+          <p:nvPr/>
+        </p:nvSpPr>
+        <p:spPr>
+          <a:xfrm>
+            <a:off x="4601911" y="4535857"/>
+            <a:ext cx="1325961" cy="938703"/>
+          </a:xfrm>
+          <a:prstGeom prst="rect">
+            <a:avLst/>
+          </a:prstGeom>
+          <a:solidFill>
+            <a:srgbClr val="C3D69B"/>
+          </a:solidFill>
+        </p:spPr>
+        <p:style>
+          <a:lnRef idx="3">
+            <a:schemeClr val="lt1"/>
+          </a:lnRef>
+          <a:fillRef idx="1">
+            <a:schemeClr val="accent1"/>
+          </a:fillRef>
+          <a:effectRef idx="1">
+            <a:schemeClr val="accent1"/>
+          </a:effectRef>
+          <a:fontRef idx="minor">
+            <a:schemeClr val="lt1"/>
+          </a:fontRef>
+        </p:style>
+        <p:txBody>
+          <a:bodyPr rtlCol="0" anchor="ctr"/>
+          <a:lstStyle/>
+          <a:p>
+            <a:pPr algn="ctr"/>
+            <a:r>
+              <a:rPr lang="en-US" altLang="ja-JP" sz="1200" u="sng" dirty="0" smtClean="0">
+                <a:solidFill>
+                  <a:srgbClr val="404040"/>
+                </a:solidFill>
+                <a:effectLst/>
+              </a:rPr>
+              <a:t>@Around</a:t>
+            </a:r>
+          </a:p>
+          <a:p>
+            <a:pPr algn="ctr"/>
+            <a:endParaRPr lang="en-US" altLang="ja-JP" sz="200" dirty="0" smtClean="0">
+              <a:solidFill>
+                <a:srgbClr val="404040"/>
+              </a:solidFill>
+              <a:effectLst/>
+            </a:endParaRPr>
+          </a:p>
+          <a:p>
+            <a:pPr algn="ctr"/>
+            <a:r>
+              <a:rPr lang="en-US" altLang="ja-JP" sz="1400" dirty="0" smtClean="0">
+                <a:solidFill>
+                  <a:srgbClr val="404040"/>
+                </a:solidFill>
+                <a:effectLst/>
+              </a:rPr>
+              <a:t>Transaction</a:t>
+            </a:r>
+          </a:p>
+          <a:p>
+            <a:pPr algn="ctr"/>
+            <a:r>
+              <a:rPr lang="en-US" altLang="ja-JP" sz="1400" dirty="0" smtClean="0">
+                <a:solidFill>
+                  <a:srgbClr val="404040"/>
+                </a:solidFill>
+                <a:effectLst/>
+              </a:rPr>
+              <a:t>Interceptor</a:t>
+            </a:r>
+            <a:endParaRPr kumimoji="1" lang="ja-JP" altLang="en-US" sz="1400" dirty="0">
+              <a:solidFill>
+                <a:srgbClr val="404040"/>
+              </a:solidFill>
+            </a:endParaRPr>
+          </a:p>
+        </p:txBody>
+      </p:sp>
+      <p:sp>
+        <p:nvSpPr>
+          <p:cNvPr id="19" name="正方形/長方形 18"/>
+          <p:cNvSpPr/>
+          <p:nvPr/>
+        </p:nvSpPr>
+        <p:spPr>
+          <a:xfrm>
+            <a:off x="8234299" y="3831736"/>
+            <a:ext cx="1335297" cy="784439"/>
+          </a:xfrm>
+          <a:prstGeom prst="rect">
+            <a:avLst/>
+          </a:prstGeom>
+          <a:solidFill>
+            <a:srgbClr val="DCE6F2"/>
+          </a:solidFill>
+        </p:spPr>
+        <p:style>
+          <a:lnRef idx="3">
+            <a:schemeClr val="lt1"/>
+          </a:lnRef>
+          <a:fillRef idx="1">
+            <a:schemeClr val="accent1"/>
+          </a:fillRef>
+          <a:effectRef idx="1">
+            <a:schemeClr val="accent1"/>
+          </a:effectRef>
+          <a:fontRef idx="minor">
+            <a:schemeClr val="lt1"/>
+          </a:fontRef>
+        </p:style>
+        <p:txBody>
+          <a:bodyPr rtlCol="0" anchor="ctr"/>
+          <a:lstStyle/>
+          <a:p>
+            <a:pPr algn="ctr"/>
+            <a:r>
+              <a:rPr lang="en-US" altLang="ja-JP" sz="1200" dirty="0" smtClean="0">
+                <a:solidFill>
+                  <a:schemeClr val="tx1">
+                    <a:lumMod val="75000"/>
+                    <a:lumOff val="25000"/>
+                  </a:schemeClr>
+                </a:solidFill>
+              </a:rPr>
+              <a:t>&lt;interface&gt;</a:t>
+            </a:r>
+          </a:p>
+          <a:p>
+            <a:pPr algn="ctr"/>
+            <a:endParaRPr lang="en-US" altLang="ja-JP" sz="200" dirty="0" smtClean="0">
+              <a:solidFill>
+                <a:schemeClr val="tx1">
+                  <a:lumMod val="75000"/>
+                  <a:lumOff val="25000"/>
+                </a:schemeClr>
+              </a:solidFill>
+            </a:endParaRPr>
+          </a:p>
+          <a:p>
+            <a:pPr algn="ctr"/>
+            <a:r>
+              <a:rPr lang="en-US" altLang="ja-JP" dirty="0" err="1" smtClean="0">
+                <a:solidFill>
+                  <a:schemeClr val="tx1">
+                    <a:lumMod val="75000"/>
+                    <a:lumOff val="25000"/>
+                  </a:schemeClr>
+                </a:solidFill>
+              </a:rPr>
+              <a:t>Todo</a:t>
+            </a:r>
+            <a:endParaRPr lang="en-US" altLang="ja-JP" dirty="0" smtClean="0">
+              <a:solidFill>
+                <a:schemeClr val="tx1">
+                  <a:lumMod val="75000"/>
+                  <a:lumOff val="25000"/>
+                </a:schemeClr>
+              </a:solidFill>
+            </a:endParaRPr>
+          </a:p>
+          <a:p>
+            <a:pPr algn="ctr"/>
+            <a:r>
+              <a:rPr lang="en-US" altLang="ja-JP" dirty="0" smtClean="0">
+                <a:solidFill>
+                  <a:schemeClr val="tx1">
+                    <a:lumMod val="75000"/>
+                    <a:lumOff val="25000"/>
+                  </a:schemeClr>
+                </a:solidFill>
+              </a:rPr>
+              <a:t>Service</a:t>
+            </a:r>
+          </a:p>
+        </p:txBody>
+      </p:sp>
+      <p:cxnSp>
+        <p:nvCxnSpPr>
+          <p:cNvPr id="21" name="直線矢印コネクタ 20"/>
+          <p:cNvCxnSpPr>
+            <a:stCxn id="8" idx="0"/>
+            <a:endCxn id="19" idx="2"/>
+          </p:cNvCxnSpPr>
+          <p:nvPr/>
+        </p:nvCxnSpPr>
+        <p:spPr>
+          <a:xfrm flipH="1" flipV="1">
+            <a:off x="8901948" y="4616175"/>
+            <a:ext cx="2" cy="336598"/>
+          </a:xfrm>
+          <a:prstGeom prst="straightConnector1">
+            <a:avLst/>
+          </a:prstGeom>
+          <a:ln w="63500">
+            <a:solidFill>
+              <a:schemeClr val="accent1">
+                <a:lumMod val="40000"/>
+                <a:lumOff val="60000"/>
+              </a:schemeClr>
+            </a:solidFill>
+            <a:tailEnd type="triangle"/>
+          </a:ln>
+          <a:effectLst/>
+        </p:spPr>
+        <p:style>
+          <a:lnRef idx="2">
+            <a:schemeClr val="accent1"/>
+          </a:lnRef>
+          <a:fillRef idx="0">
+            <a:schemeClr val="accent1"/>
+          </a:fillRef>
+          <a:effectRef idx="1">
+            <a:schemeClr val="accent1"/>
+          </a:effectRef>
+          <a:fontRef idx="minor">
+            <a:schemeClr val="tx1"/>
+          </a:fontRef>
+        </p:style>
+      </p:cxnSp>
+      <p:cxnSp>
+        <p:nvCxnSpPr>
+          <p:cNvPr id="27" name="直線矢印コネクタ 26"/>
+          <p:cNvCxnSpPr/>
+          <p:nvPr/>
+        </p:nvCxnSpPr>
+        <p:spPr>
+          <a:xfrm>
+            <a:off x="3633987" y="1814952"/>
+            <a:ext cx="773434" cy="0"/>
+          </a:xfrm>
+          <a:prstGeom prst="straightConnector1">
+            <a:avLst/>
+          </a:prstGeom>
+          <a:ln w="38100">
+            <a:solidFill>
+              <a:schemeClr val="bg1">
+                <a:lumMod val="50000"/>
+              </a:schemeClr>
+            </a:solidFill>
+            <a:headEnd type="arrow"/>
+            <a:tailEnd type="arrow"/>
+          </a:ln>
+          <a:effectLst/>
+        </p:spPr>
+        <p:style>
+          <a:lnRef idx="2">
+            <a:schemeClr val="accent1"/>
+          </a:lnRef>
+          <a:fillRef idx="0">
+            <a:schemeClr val="accent1"/>
+          </a:fillRef>
+          <a:effectRef idx="1">
+            <a:schemeClr val="accent1"/>
+          </a:effectRef>
+          <a:fontRef idx="minor">
+            <a:schemeClr val="tx1"/>
+          </a:fontRef>
+        </p:style>
+      </p:cxnSp>
+      <p:cxnSp>
+        <p:nvCxnSpPr>
+          <p:cNvPr id="33" name="カギ線コネクタ 32"/>
+          <p:cNvCxnSpPr>
+            <a:stCxn id="5" idx="2"/>
+            <a:endCxn id="14" idx="1"/>
+          </p:cNvCxnSpPr>
+          <p:nvPr/>
+        </p:nvCxnSpPr>
+        <p:spPr>
+          <a:xfrm rot="5400000">
+            <a:off x="3354870" y="3204960"/>
+            <a:ext cx="2590664" cy="728349"/>
+          </a:xfrm>
+          <a:prstGeom prst="bentConnector4">
+            <a:avLst>
+              <a:gd name="adj1" fmla="val 35655"/>
+              <a:gd name="adj2" fmla="val 131386"/>
+            </a:avLst>
+          </a:prstGeom>
+          <a:ln w="38100">
+            <a:solidFill>
+              <a:schemeClr val="bg1">
+                <a:lumMod val="50000"/>
+              </a:schemeClr>
+            </a:solidFill>
+            <a:headEnd type="arrow"/>
+            <a:tailEnd type="arrow"/>
+          </a:ln>
+          <a:effectLst/>
+        </p:spPr>
+        <p:style>
+          <a:lnRef idx="2">
+            <a:schemeClr val="accent1"/>
+          </a:lnRef>
+          <a:fillRef idx="0">
+            <a:schemeClr val="accent1"/>
+          </a:fillRef>
+          <a:effectRef idx="1">
+            <a:schemeClr val="accent1"/>
+          </a:effectRef>
+          <a:fontRef idx="minor">
+            <a:schemeClr val="tx1"/>
+          </a:fontRef>
+        </p:style>
+      </p:cxnSp>
+      <p:cxnSp>
+        <p:nvCxnSpPr>
+          <p:cNvPr id="43" name="直線矢印コネクタ 42"/>
+          <p:cNvCxnSpPr>
+            <a:endCxn id="19" idx="1"/>
+          </p:cNvCxnSpPr>
+          <p:nvPr/>
+        </p:nvCxnSpPr>
+        <p:spPr>
+          <a:xfrm flipV="1">
+            <a:off x="7695695" y="4223956"/>
+            <a:ext cx="538604" cy="611867"/>
+          </a:xfrm>
+          <a:prstGeom prst="straightConnector1">
+            <a:avLst/>
+          </a:prstGeom>
+          <a:ln w="38100">
+            <a:solidFill>
+              <a:schemeClr val="bg1">
+                <a:lumMod val="50000"/>
+              </a:schemeClr>
+            </a:solidFill>
+            <a:headEnd type="arrow"/>
+            <a:tailEnd type="arrow"/>
+          </a:ln>
+          <a:effectLst/>
+        </p:spPr>
+        <p:style>
+          <a:lnRef idx="2">
+            <a:schemeClr val="accent1"/>
+          </a:lnRef>
+          <a:fillRef idx="0">
+            <a:schemeClr val="accent1"/>
+          </a:fillRef>
+          <a:effectRef idx="1">
+            <a:schemeClr val="accent1"/>
+          </a:effectRef>
+          <a:fontRef idx="minor">
+            <a:schemeClr val="tx1"/>
+          </a:fontRef>
+        </p:style>
+      </p:cxnSp>
+      <p:sp>
+        <p:nvSpPr>
+          <p:cNvPr id="50" name="正方形/長方形 49"/>
+          <p:cNvSpPr/>
+          <p:nvPr/>
+        </p:nvSpPr>
+        <p:spPr>
+          <a:xfrm>
+            <a:off x="-879816" y="5818595"/>
+            <a:ext cx="1683428" cy="452178"/>
+          </a:xfrm>
+          <a:prstGeom prst="rect">
+            <a:avLst/>
+          </a:prstGeom>
+          <a:solidFill>
+            <a:srgbClr val="DCE6F2"/>
+          </a:solidFill>
+        </p:spPr>
+        <p:style>
+          <a:lnRef idx="3">
+            <a:schemeClr val="lt1"/>
+          </a:lnRef>
+          <a:fillRef idx="1">
+            <a:schemeClr val="accent1"/>
+          </a:fillRef>
+          <a:effectRef idx="1">
+            <a:schemeClr val="accent1"/>
+          </a:effectRef>
+          <a:fontRef idx="minor">
+            <a:schemeClr val="lt1"/>
+          </a:fontRef>
+        </p:style>
+        <p:txBody>
+          <a:bodyPr rtlCol="0" anchor="t" anchorCtr="0"/>
+          <a:lstStyle/>
+          <a:p>
+            <a:pPr algn="ctr"/>
+            <a:r>
+              <a:rPr lang="en-US" altLang="ja-JP" dirty="0" err="1" smtClean="0">
+                <a:solidFill>
+                  <a:schemeClr val="tx1">
+                    <a:lumMod val="65000"/>
+                    <a:lumOff val="35000"/>
+                  </a:schemeClr>
+                </a:solidFill>
+                <a:effectLst/>
+              </a:rPr>
+              <a:t>TodoClientTest</a:t>
+            </a:r>
+            <a:endParaRPr kumimoji="1" lang="ja-JP" altLang="en-US" dirty="0">
+              <a:solidFill>
+                <a:schemeClr val="tx1">
+                  <a:lumMod val="65000"/>
+                  <a:lumOff val="35000"/>
+                </a:schemeClr>
+              </a:solidFill>
+            </a:endParaRPr>
+          </a:p>
+        </p:txBody>
+      </p:sp>
+      <p:sp>
+        <p:nvSpPr>
+          <p:cNvPr id="59" name="正方形/長方形 58"/>
+          <p:cNvSpPr/>
+          <p:nvPr/>
+        </p:nvSpPr>
+        <p:spPr>
+          <a:xfrm>
+            <a:off x="-850915" y="3676875"/>
+            <a:ext cx="1614434" cy="1526898"/>
+          </a:xfrm>
+          <a:prstGeom prst="rect">
+            <a:avLst/>
+          </a:prstGeom>
+          <a:solidFill>
+            <a:srgbClr val="C3D69B"/>
+          </a:solidFill>
+        </p:spPr>
+        <p:style>
+          <a:lnRef idx="3">
+            <a:schemeClr val="lt1"/>
+          </a:lnRef>
+          <a:fillRef idx="1">
+            <a:schemeClr val="accent1"/>
+          </a:fillRef>
+          <a:effectRef idx="1">
+            <a:schemeClr val="accent1"/>
+          </a:effectRef>
+          <a:fontRef idx="minor">
+            <a:schemeClr val="lt1"/>
+          </a:fontRef>
+        </p:style>
+        <p:txBody>
+          <a:bodyPr rtlCol="0" anchor="t" anchorCtr="0"/>
+          <a:lstStyle/>
+          <a:p>
+            <a:pPr algn="ctr"/>
+            <a:r>
+              <a:rPr kumimoji="1" lang="en-US" altLang="ja-JP" dirty="0" smtClean="0">
+                <a:solidFill>
+                  <a:srgbClr val="404040"/>
+                </a:solidFill>
+              </a:rPr>
+              <a:t>Spring AOP</a:t>
+            </a:r>
+            <a:endParaRPr kumimoji="1" lang="ja-JP" altLang="en-US" dirty="0">
+              <a:solidFill>
+                <a:srgbClr val="404040"/>
+              </a:solidFill>
+            </a:endParaRPr>
+          </a:p>
+        </p:txBody>
+      </p:sp>
+      <p:sp>
+        <p:nvSpPr>
+          <p:cNvPr id="60" name="正方形/長方形 59"/>
+          <p:cNvSpPr/>
+          <p:nvPr/>
+        </p:nvSpPr>
+        <p:spPr>
+          <a:xfrm>
+            <a:off x="-652130" y="2516866"/>
+            <a:ext cx="1213909" cy="784439"/>
+          </a:xfrm>
+          <a:prstGeom prst="rect">
+            <a:avLst/>
+          </a:prstGeom>
+          <a:solidFill>
+            <a:srgbClr val="DCE6F2"/>
+          </a:solidFill>
+        </p:spPr>
+        <p:style>
+          <a:lnRef idx="3">
+            <a:schemeClr val="lt1"/>
+          </a:lnRef>
+          <a:fillRef idx="1">
+            <a:schemeClr val="accent1"/>
+          </a:fillRef>
+          <a:effectRef idx="1">
+            <a:schemeClr val="accent1"/>
+          </a:effectRef>
+          <a:fontRef idx="minor">
+            <a:schemeClr val="lt1"/>
+          </a:fontRef>
+        </p:style>
+        <p:txBody>
+          <a:bodyPr rtlCol="0" anchor="ctr"/>
+          <a:lstStyle/>
+          <a:p>
+            <a:pPr algn="ctr"/>
+            <a:r>
+              <a:rPr lang="en-US" altLang="ja-JP" sz="1200" dirty="0" smtClean="0">
+                <a:solidFill>
+                  <a:schemeClr val="tx1">
+                    <a:lumMod val="75000"/>
+                    <a:lumOff val="25000"/>
+                  </a:schemeClr>
+                </a:solidFill>
+              </a:rPr>
+              <a:t>&lt;interface&gt;</a:t>
+            </a:r>
+          </a:p>
+          <a:p>
+            <a:pPr algn="ctr"/>
+            <a:endParaRPr lang="en-US" altLang="ja-JP" sz="200" dirty="0" smtClean="0">
+              <a:solidFill>
+                <a:schemeClr val="tx1">
+                  <a:lumMod val="75000"/>
+                  <a:lumOff val="25000"/>
+                </a:schemeClr>
+              </a:solidFill>
+            </a:endParaRPr>
+          </a:p>
+          <a:p>
+            <a:pPr algn="ctr"/>
+            <a:r>
+              <a:rPr lang="en-US" altLang="ja-JP" dirty="0" err="1" smtClean="0">
+                <a:solidFill>
+                  <a:schemeClr val="tx1">
+                    <a:lumMod val="75000"/>
+                    <a:lumOff val="25000"/>
+                  </a:schemeClr>
+                </a:solidFill>
+              </a:rPr>
+              <a:t>Todo</a:t>
+            </a:r>
+            <a:endParaRPr lang="en-US" altLang="ja-JP" dirty="0" smtClean="0">
+              <a:solidFill>
+                <a:schemeClr val="tx1">
+                  <a:lumMod val="75000"/>
+                  <a:lumOff val="25000"/>
+                </a:schemeClr>
+              </a:solidFill>
+            </a:endParaRPr>
+          </a:p>
+          <a:p>
+            <a:pPr algn="ctr"/>
+            <a:r>
+              <a:rPr lang="en-US" altLang="ja-JP" dirty="0" smtClean="0">
+                <a:solidFill>
+                  <a:schemeClr val="tx1">
+                    <a:lumMod val="75000"/>
+                    <a:lumOff val="25000"/>
+                  </a:schemeClr>
+                </a:solidFill>
+              </a:rPr>
+              <a:t>Service</a:t>
+            </a:r>
+          </a:p>
+        </p:txBody>
+      </p:sp>
+      <p:sp>
+        <p:nvSpPr>
+          <p:cNvPr id="61" name="正方形/長方形 60"/>
+          <p:cNvSpPr/>
+          <p:nvPr/>
+        </p:nvSpPr>
+        <p:spPr>
+          <a:xfrm>
+            <a:off x="-736594" y="1469108"/>
+            <a:ext cx="1382838" cy="698335"/>
+          </a:xfrm>
+          <a:prstGeom prst="rect">
+            <a:avLst/>
+          </a:prstGeom>
+          <a:solidFill>
+            <a:schemeClr val="tx2">
+              <a:lumMod val="40000"/>
+              <a:lumOff val="60000"/>
+            </a:schemeClr>
+          </a:solidFill>
+        </p:spPr>
+        <p:style>
+          <a:lnRef idx="3">
+            <a:schemeClr val="lt1"/>
+          </a:lnRef>
+          <a:fillRef idx="1">
+            <a:schemeClr val="accent1"/>
+          </a:fillRef>
+          <a:effectRef idx="1">
+            <a:schemeClr val="accent1"/>
+          </a:effectRef>
+          <a:fontRef idx="minor">
+            <a:schemeClr val="lt1"/>
+          </a:fontRef>
+        </p:style>
+        <p:txBody>
+          <a:bodyPr rtlCol="0" anchor="ctr"/>
+          <a:lstStyle/>
+          <a:p>
+            <a:pPr algn="ctr"/>
+            <a:r>
+              <a:rPr lang="en-US" altLang="ja-JP" sz="1200" dirty="0" smtClean="0">
+                <a:solidFill>
+                  <a:schemeClr val="tx1">
+                    <a:lumMod val="75000"/>
+                    <a:lumOff val="25000"/>
+                  </a:schemeClr>
+                </a:solidFill>
+              </a:rPr>
+              <a:t>&lt;JAX-WS&gt;</a:t>
+            </a:r>
+          </a:p>
+          <a:p>
+            <a:pPr algn="ctr"/>
+            <a:endParaRPr lang="en-US" altLang="ja-JP" sz="200" dirty="0" smtClean="0">
+              <a:solidFill>
+                <a:schemeClr val="tx1">
+                  <a:lumMod val="75000"/>
+                  <a:lumOff val="25000"/>
+                </a:schemeClr>
+              </a:solidFill>
+            </a:endParaRPr>
+          </a:p>
+          <a:p>
+            <a:pPr algn="ctr"/>
+            <a:r>
+              <a:rPr lang="en-US" altLang="ja-JP" dirty="0" err="1" smtClean="0">
+                <a:solidFill>
+                  <a:schemeClr val="tx1">
+                    <a:lumMod val="75000"/>
+                    <a:lumOff val="25000"/>
+                  </a:schemeClr>
+                </a:solidFill>
+              </a:rPr>
+              <a:t>PortStub</a:t>
+            </a:r>
+            <a:endParaRPr lang="en-US" altLang="ja-JP" dirty="0" smtClean="0">
+              <a:solidFill>
+                <a:schemeClr val="tx1">
+                  <a:lumMod val="75000"/>
+                  <a:lumOff val="25000"/>
+                </a:schemeClr>
+              </a:solidFill>
+            </a:endParaRPr>
+          </a:p>
+        </p:txBody>
+      </p:sp>
+      <p:cxnSp>
+        <p:nvCxnSpPr>
+          <p:cNvPr id="62" name="直線矢印コネクタ 61"/>
+          <p:cNvCxnSpPr>
+            <a:stCxn id="61" idx="2"/>
+            <a:endCxn id="60" idx="0"/>
+          </p:cNvCxnSpPr>
+          <p:nvPr/>
+        </p:nvCxnSpPr>
+        <p:spPr>
+          <a:xfrm>
+            <a:off x="-45175" y="2167443"/>
+            <a:ext cx="0" cy="349423"/>
+          </a:xfrm>
+          <a:prstGeom prst="straightConnector1">
+            <a:avLst/>
+          </a:prstGeom>
+          <a:ln w="63500">
+            <a:solidFill>
+              <a:schemeClr val="accent1">
+                <a:lumMod val="40000"/>
+                <a:lumOff val="60000"/>
+              </a:schemeClr>
+            </a:solidFill>
+            <a:tailEnd type="triangle"/>
+          </a:ln>
+          <a:effectLst/>
+        </p:spPr>
+        <p:style>
+          <a:lnRef idx="2">
+            <a:schemeClr val="accent1"/>
+          </a:lnRef>
+          <a:fillRef idx="0">
+            <a:schemeClr val="accent1"/>
+          </a:fillRef>
+          <a:effectRef idx="1">
+            <a:schemeClr val="accent1"/>
+          </a:effectRef>
+          <a:fontRef idx="minor">
+            <a:schemeClr val="tx1"/>
+          </a:fontRef>
+        </p:style>
+      </p:cxnSp>
+      <p:sp>
+        <p:nvSpPr>
+          <p:cNvPr id="74" name="左右矢印 73"/>
+          <p:cNvSpPr/>
+          <p:nvPr/>
+        </p:nvSpPr>
+        <p:spPr>
+          <a:xfrm>
+            <a:off x="725323" y="1395979"/>
+            <a:ext cx="1382874" cy="898732"/>
+          </a:xfrm>
+          <a:prstGeom prst="leftRightArrow">
+            <a:avLst/>
+          </a:prstGeom>
+          <a:ln>
+            <a:solidFill>
+              <a:schemeClr val="tx1">
+                <a:lumMod val="50000"/>
+                <a:lumOff val="50000"/>
+              </a:schemeClr>
+            </a:solidFill>
+          </a:ln>
+        </p:spPr>
+        <p:style>
+          <a:lnRef idx="2">
+            <a:schemeClr val="dk1"/>
+          </a:lnRef>
+          <a:fillRef idx="1">
+            <a:schemeClr val="lt1"/>
+          </a:fillRef>
+          <a:effectRef idx="0">
+            <a:schemeClr val="dk1"/>
+          </a:effectRef>
+          <a:fontRef idx="minor">
+            <a:schemeClr val="dk1"/>
+          </a:fontRef>
+        </p:style>
+        <p:txBody>
+          <a:bodyPr rtlCol="0" anchor="ctr"/>
+          <a:lstStyle/>
+          <a:p>
+            <a:pPr algn="ctr"/>
+            <a:r>
+              <a:rPr kumimoji="1" lang="en-US" altLang="ja-JP" sz="1400" dirty="0" smtClean="0">
+                <a:solidFill>
+                  <a:srgbClr val="595959"/>
+                </a:solidFill>
+              </a:rPr>
+              <a:t>SOAP 1.2</a:t>
+            </a:r>
+          </a:p>
+          <a:p>
+            <a:pPr algn="ctr"/>
+            <a:r>
+              <a:rPr lang="en-US" altLang="ja-JP" sz="1400" dirty="0" smtClean="0">
+                <a:solidFill>
+                  <a:srgbClr val="595959"/>
+                </a:solidFill>
+              </a:rPr>
+              <a:t>over HTTP</a:t>
+            </a:r>
+            <a:endParaRPr kumimoji="1" lang="ja-JP" altLang="en-US" sz="1400" dirty="0">
+              <a:solidFill>
+                <a:srgbClr val="595959"/>
+              </a:solidFill>
+            </a:endParaRPr>
+          </a:p>
+        </p:txBody>
+      </p:sp>
+      <p:sp>
+        <p:nvSpPr>
+          <p:cNvPr id="76" name="正方形/長方形 75"/>
+          <p:cNvSpPr/>
+          <p:nvPr/>
+        </p:nvSpPr>
+        <p:spPr>
+          <a:xfrm>
+            <a:off x="-1279514" y="6881844"/>
+            <a:ext cx="2487129" cy="680332"/>
+          </a:xfrm>
+          <a:prstGeom prst="rect">
+            <a:avLst/>
+          </a:prstGeom>
+          <a:solidFill>
+            <a:schemeClr val="bg1">
+              <a:lumMod val="95000"/>
+            </a:schemeClr>
+          </a:solidFill>
+          <a:ln w="38100" cmpd="dbl">
+            <a:noFill/>
+            <a:prstDash val="solid"/>
+          </a:ln>
+        </p:spPr>
+        <p:style>
+          <a:lnRef idx="2">
+            <a:schemeClr val="accent3">
+              <a:shade val="50000"/>
+            </a:schemeClr>
+          </a:lnRef>
+          <a:fillRef idx="1">
+            <a:schemeClr val="accent3"/>
+          </a:fillRef>
+          <a:effectRef idx="0">
+            <a:schemeClr val="accent3"/>
+          </a:effectRef>
+          <a:fontRef idx="minor">
+            <a:schemeClr val="lt1"/>
+          </a:fontRef>
+        </p:style>
+        <p:txBody>
+          <a:bodyPr wrap="square" rtlCol="0" anchor="t" anchorCtr="0"/>
+          <a:lstStyle/>
+          <a:p>
+            <a:pPr algn="ctr"/>
+            <a:r>
+              <a:rPr lang="en-US" altLang="ja-JP" sz="4000" dirty="0" err="1" smtClean="0">
+                <a:solidFill>
+                  <a:schemeClr val="accent3"/>
+                </a:solidFill>
+              </a:rPr>
+              <a:t>J</a:t>
+            </a:r>
+            <a:r>
+              <a:rPr lang="en-US" altLang="ja-JP" sz="4000" dirty="0" err="1" smtClean="0">
+                <a:solidFill>
+                  <a:schemeClr val="accent2"/>
+                </a:solidFill>
+              </a:rPr>
+              <a:t>U</a:t>
+            </a:r>
+            <a:r>
+              <a:rPr lang="en-US" altLang="ja-JP" sz="3000" dirty="0" err="1" smtClean="0">
+                <a:solidFill>
+                  <a:schemeClr val="accent2"/>
+                </a:solidFill>
+              </a:rPr>
+              <a:t>nit</a:t>
+            </a:r>
+            <a:r>
+              <a:rPr lang="en-US" altLang="ja-JP" sz="3600" dirty="0" smtClean="0">
+                <a:solidFill>
+                  <a:schemeClr val="accent2"/>
+                </a:solidFill>
+              </a:rPr>
+              <a:t> </a:t>
+            </a:r>
+            <a:r>
+              <a:rPr lang="en-US" altLang="ja-JP" sz="3600" dirty="0" smtClean="0">
+                <a:solidFill>
+                  <a:srgbClr val="404040"/>
+                </a:solidFill>
+              </a:rPr>
+              <a:t>4</a:t>
+            </a:r>
+          </a:p>
+        </p:txBody>
+      </p:sp>
+      <p:cxnSp>
+        <p:nvCxnSpPr>
+          <p:cNvPr id="77" name="直線矢印コネクタ 76"/>
+          <p:cNvCxnSpPr>
+            <a:stCxn id="76" idx="0"/>
+            <a:endCxn id="50" idx="2"/>
+          </p:cNvCxnSpPr>
+          <p:nvPr/>
+        </p:nvCxnSpPr>
+        <p:spPr>
+          <a:xfrm flipH="1" flipV="1">
+            <a:off x="-38102" y="6270773"/>
+            <a:ext cx="2153" cy="611071"/>
+          </a:xfrm>
+          <a:prstGeom prst="straightConnector1">
+            <a:avLst/>
+          </a:prstGeom>
+          <a:ln w="38100">
+            <a:solidFill>
+              <a:schemeClr val="bg1">
+                <a:lumMod val="50000"/>
+              </a:schemeClr>
+            </a:solidFill>
+            <a:headEnd type="arrow"/>
+            <a:tailEnd type="arrow"/>
+          </a:ln>
+          <a:effectLst/>
+        </p:spPr>
+        <p:style>
+          <a:lnRef idx="2">
+            <a:schemeClr val="accent1"/>
+          </a:lnRef>
+          <a:fillRef idx="0">
+            <a:schemeClr val="accent1"/>
+          </a:fillRef>
+          <a:effectRef idx="1">
+            <a:schemeClr val="accent1"/>
+          </a:effectRef>
+          <a:fontRef idx="minor">
+            <a:schemeClr val="tx1"/>
+          </a:fontRef>
+        </p:style>
+      </p:cxnSp>
+      <p:sp>
+        <p:nvSpPr>
+          <p:cNvPr id="103" name="正方形/長方形 102"/>
+          <p:cNvSpPr/>
+          <p:nvPr/>
+        </p:nvSpPr>
+        <p:spPr>
+          <a:xfrm>
+            <a:off x="-703780" y="4086138"/>
+            <a:ext cx="1325961" cy="933856"/>
+          </a:xfrm>
+          <a:prstGeom prst="rect">
+            <a:avLst/>
+          </a:prstGeom>
+          <a:solidFill>
+            <a:srgbClr val="C3D69B"/>
+          </a:solidFill>
+        </p:spPr>
+        <p:style>
+          <a:lnRef idx="3">
+            <a:schemeClr val="lt1"/>
+          </a:lnRef>
+          <a:fillRef idx="1">
+            <a:schemeClr val="accent1"/>
+          </a:fillRef>
+          <a:effectRef idx="1">
+            <a:schemeClr val="accent1"/>
+          </a:effectRef>
+          <a:fontRef idx="minor">
+            <a:schemeClr val="lt1"/>
+          </a:fontRef>
+        </p:style>
+        <p:txBody>
+          <a:bodyPr rtlCol="0" anchor="ctr"/>
+          <a:lstStyle/>
+          <a:p>
+            <a:pPr algn="ctr"/>
+            <a:r>
+              <a:rPr lang="en-US" altLang="ja-JP" sz="1200" u="sng" dirty="0" smtClean="0">
+                <a:solidFill>
+                  <a:srgbClr val="404040"/>
+                </a:solidFill>
+                <a:effectLst/>
+              </a:rPr>
+              <a:t>@Around</a:t>
+            </a:r>
+          </a:p>
+          <a:p>
+            <a:pPr algn="ctr"/>
+            <a:endParaRPr lang="en-US" altLang="ja-JP" sz="200" dirty="0" smtClean="0">
+              <a:solidFill>
+                <a:srgbClr val="404040"/>
+              </a:solidFill>
+              <a:effectLst/>
+            </a:endParaRPr>
+          </a:p>
+          <a:p>
+            <a:pPr algn="ctr"/>
+            <a:r>
+              <a:rPr lang="en-US" altLang="ja-JP" sz="1400" dirty="0" err="1" smtClean="0">
+                <a:solidFill>
+                  <a:schemeClr val="tx1">
+                    <a:lumMod val="75000"/>
+                    <a:lumOff val="25000"/>
+                  </a:schemeClr>
+                </a:solidFill>
+              </a:rPr>
+              <a:t>JaxWs</a:t>
+            </a:r>
+            <a:endParaRPr lang="en-US" altLang="ja-JP" sz="1400" dirty="0" smtClean="0">
+              <a:solidFill>
+                <a:schemeClr val="tx1">
+                  <a:lumMod val="75000"/>
+                  <a:lumOff val="25000"/>
+                </a:schemeClr>
+              </a:solidFill>
+            </a:endParaRPr>
+          </a:p>
+          <a:p>
+            <a:pPr algn="ctr"/>
+            <a:r>
+              <a:rPr lang="en-US" altLang="ja-JP" sz="1400" dirty="0" err="1" smtClean="0">
+                <a:solidFill>
+                  <a:schemeClr val="tx1">
+                    <a:lumMod val="75000"/>
+                    <a:lumOff val="25000"/>
+                  </a:schemeClr>
+                </a:solidFill>
+              </a:rPr>
+              <a:t>PortClient</a:t>
+            </a:r>
+            <a:endParaRPr lang="en-US" altLang="ja-JP" sz="1400" dirty="0" smtClean="0">
+              <a:solidFill>
+                <a:schemeClr val="tx1">
+                  <a:lumMod val="75000"/>
+                  <a:lumOff val="25000"/>
+                </a:schemeClr>
+              </a:solidFill>
+            </a:endParaRPr>
+          </a:p>
+          <a:p>
+            <a:pPr algn="ctr"/>
+            <a:r>
+              <a:rPr lang="en-US" altLang="ja-JP" sz="1400" dirty="0" smtClean="0">
+                <a:solidFill>
+                  <a:schemeClr val="tx1">
+                    <a:lumMod val="75000"/>
+                    <a:lumOff val="25000"/>
+                  </a:schemeClr>
+                </a:solidFill>
+              </a:rPr>
+              <a:t>Interceptor</a:t>
+            </a:r>
+            <a:endParaRPr kumimoji="1" lang="ja-JP" altLang="en-US" sz="1400" dirty="0">
+              <a:solidFill>
+                <a:schemeClr val="tx1">
+                  <a:lumMod val="75000"/>
+                  <a:lumOff val="25000"/>
+                </a:schemeClr>
+              </a:solidFill>
+            </a:endParaRPr>
+          </a:p>
+        </p:txBody>
+      </p:sp>
+      <p:cxnSp>
+        <p:nvCxnSpPr>
+          <p:cNvPr id="113" name="直線矢印コネクタ 112"/>
+          <p:cNvCxnSpPr>
+            <a:stCxn id="50" idx="0"/>
+            <a:endCxn id="59" idx="2"/>
+          </p:cNvCxnSpPr>
+          <p:nvPr/>
+        </p:nvCxnSpPr>
+        <p:spPr>
+          <a:xfrm flipH="1" flipV="1">
+            <a:off x="-43698" y="5203773"/>
+            <a:ext cx="5596" cy="614822"/>
+          </a:xfrm>
+          <a:prstGeom prst="straightConnector1">
+            <a:avLst/>
+          </a:prstGeom>
+          <a:ln w="38100">
+            <a:solidFill>
+              <a:schemeClr val="bg1">
+                <a:lumMod val="50000"/>
+              </a:schemeClr>
+            </a:solidFill>
+            <a:headEnd type="arrow"/>
+            <a:tailEnd type="arrow"/>
+          </a:ln>
+          <a:effectLst/>
+        </p:spPr>
+        <p:style>
+          <a:lnRef idx="2">
+            <a:schemeClr val="accent1"/>
+          </a:lnRef>
+          <a:fillRef idx="0">
+            <a:schemeClr val="accent1"/>
+          </a:fillRef>
+          <a:effectRef idx="1">
+            <a:schemeClr val="accent1"/>
+          </a:effectRef>
+          <a:fontRef idx="minor">
+            <a:schemeClr val="tx1"/>
+          </a:fontRef>
+        </p:style>
+      </p:cxnSp>
+      <p:cxnSp>
+        <p:nvCxnSpPr>
+          <p:cNvPr id="121" name="直線矢印コネクタ 120"/>
+          <p:cNvCxnSpPr>
+            <a:stCxn id="59" idx="0"/>
+            <a:endCxn id="60" idx="2"/>
+          </p:cNvCxnSpPr>
+          <p:nvPr/>
+        </p:nvCxnSpPr>
+        <p:spPr>
+          <a:xfrm flipH="1" flipV="1">
+            <a:off x="-45175" y="3301305"/>
+            <a:ext cx="1477" cy="375570"/>
+          </a:xfrm>
+          <a:prstGeom prst="straightConnector1">
+            <a:avLst/>
+          </a:prstGeom>
+          <a:ln w="38100">
+            <a:solidFill>
+              <a:schemeClr val="bg1">
+                <a:lumMod val="50000"/>
+              </a:schemeClr>
+            </a:solidFill>
+            <a:headEnd type="arrow"/>
+            <a:tailEnd type="arrow"/>
+          </a:ln>
+          <a:effectLst/>
+        </p:spPr>
+        <p:style>
+          <a:lnRef idx="2">
+            <a:schemeClr val="accent1"/>
+          </a:lnRef>
+          <a:fillRef idx="0">
+            <a:schemeClr val="accent1"/>
+          </a:fillRef>
+          <a:effectRef idx="1">
+            <a:schemeClr val="accent1"/>
+          </a:effectRef>
+          <a:fontRef idx="minor">
+            <a:schemeClr val="tx1"/>
+          </a:fontRef>
+        </p:style>
+      </p:cxnSp>
+      <p:sp>
+        <p:nvSpPr>
+          <p:cNvPr id="36" name="正方形/長方形 35"/>
+          <p:cNvSpPr/>
+          <p:nvPr/>
+        </p:nvSpPr>
+        <p:spPr>
+          <a:xfrm>
+            <a:off x="2173561" y="1006297"/>
+            <a:ext cx="1449489" cy="1496117"/>
+          </a:xfrm>
+          <a:prstGeom prst="rect">
+            <a:avLst/>
+          </a:prstGeom>
+          <a:solidFill>
+            <a:srgbClr val="E6B9B8"/>
+          </a:solidFill>
+        </p:spPr>
+        <p:style>
+          <a:lnRef idx="3">
+            <a:schemeClr val="lt1"/>
+          </a:lnRef>
+          <a:fillRef idx="1">
+            <a:schemeClr val="accent2"/>
+          </a:fillRef>
+          <a:effectRef idx="1">
+            <a:schemeClr val="accent2"/>
+          </a:effectRef>
+          <a:fontRef idx="minor">
+            <a:schemeClr val="lt1"/>
+          </a:fontRef>
+        </p:style>
+        <p:txBody>
+          <a:bodyPr rtlCol="0" anchor="ctr" anchorCtr="0"/>
+          <a:lstStyle/>
+          <a:p>
+            <a:pPr algn="ctr"/>
+            <a:r>
+              <a:rPr lang="en-US" altLang="ja-JP" dirty="0" smtClean="0">
+                <a:solidFill>
+                  <a:srgbClr val="C0504D"/>
+                </a:solidFill>
+              </a:rPr>
+              <a:t>JDK</a:t>
+            </a:r>
+          </a:p>
+          <a:p>
+            <a:pPr algn="ctr"/>
+            <a:r>
+              <a:rPr lang="en-US" altLang="ja-JP" dirty="0" smtClean="0">
+                <a:solidFill>
+                  <a:srgbClr val="C0504D"/>
+                </a:solidFill>
+              </a:rPr>
+              <a:t>HTTP Server</a:t>
+            </a:r>
+            <a:endParaRPr lang="en-US" altLang="ja-JP" dirty="0">
+              <a:solidFill>
+                <a:srgbClr val="C0504D"/>
+              </a:solidFill>
+            </a:endParaRPr>
+          </a:p>
+          <a:p>
+            <a:pPr algn="ctr"/>
+            <a:r>
+              <a:rPr lang="en-US" altLang="ja-JP" dirty="0" smtClean="0">
+                <a:solidFill>
+                  <a:srgbClr val="C0504D"/>
+                </a:solidFill>
+              </a:rPr>
+              <a:t>(</a:t>
+            </a:r>
+            <a:r>
+              <a:rPr lang="en-US" altLang="ja-JP" dirty="0" smtClean="0">
+                <a:solidFill>
+                  <a:srgbClr val="C0504D"/>
+                </a:solidFill>
+              </a:rPr>
+              <a:t>JAX-WS)</a:t>
+            </a:r>
+            <a:endParaRPr kumimoji="1" lang="ja-JP" altLang="en-US" dirty="0">
+              <a:solidFill>
+                <a:srgbClr val="C0504D"/>
+              </a:solidFill>
+            </a:endParaRPr>
+          </a:p>
+        </p:txBody>
+      </p:sp>
+      <p:sp>
+        <p:nvSpPr>
+          <p:cNvPr id="39" name="正方形/長方形 38"/>
+          <p:cNvSpPr/>
+          <p:nvPr/>
+        </p:nvSpPr>
+        <p:spPr>
+          <a:xfrm>
+            <a:off x="6182978" y="4540704"/>
+            <a:ext cx="1325961" cy="933856"/>
+          </a:xfrm>
+          <a:prstGeom prst="rect">
+            <a:avLst/>
+          </a:prstGeom>
+          <a:solidFill>
+            <a:srgbClr val="C3D69B"/>
+          </a:solidFill>
+        </p:spPr>
+        <p:style>
+          <a:lnRef idx="3">
+            <a:schemeClr val="lt1"/>
+          </a:lnRef>
+          <a:fillRef idx="1">
+            <a:schemeClr val="accent1"/>
+          </a:fillRef>
+          <a:effectRef idx="1">
+            <a:schemeClr val="accent1"/>
+          </a:effectRef>
+          <a:fontRef idx="minor">
+            <a:schemeClr val="lt1"/>
+          </a:fontRef>
+        </p:style>
+        <p:txBody>
+          <a:bodyPr rtlCol="0" anchor="ctr"/>
+          <a:lstStyle/>
+          <a:p>
+            <a:pPr algn="ctr"/>
+            <a:r>
+              <a:rPr lang="en-US" altLang="ja-JP" sz="1200" u="sng" dirty="0" smtClean="0">
+                <a:solidFill>
+                  <a:srgbClr val="404040"/>
+                </a:solidFill>
+                <a:effectLst/>
+              </a:rPr>
+              <a:t>@Around</a:t>
+            </a:r>
+          </a:p>
+          <a:p>
+            <a:pPr algn="ctr"/>
+            <a:endParaRPr lang="en-US" altLang="ja-JP" sz="200" dirty="0" smtClean="0">
+              <a:solidFill>
+                <a:srgbClr val="404040"/>
+              </a:solidFill>
+              <a:effectLst/>
+            </a:endParaRPr>
+          </a:p>
+          <a:p>
+            <a:pPr algn="ctr"/>
+            <a:r>
+              <a:rPr lang="en-US" altLang="ja-JP" sz="1400" dirty="0" smtClean="0">
+                <a:solidFill>
+                  <a:srgbClr val="404040"/>
+                </a:solidFill>
+                <a:effectLst/>
+              </a:rPr>
+              <a:t>Method</a:t>
+            </a:r>
+          </a:p>
+          <a:p>
+            <a:pPr algn="ctr"/>
+            <a:r>
+              <a:rPr lang="en-US" altLang="ja-JP" sz="1400" dirty="0" smtClean="0">
+                <a:solidFill>
+                  <a:srgbClr val="404040"/>
+                </a:solidFill>
+                <a:effectLst/>
+              </a:rPr>
+              <a:t>Validation</a:t>
+            </a:r>
+          </a:p>
+          <a:p>
+            <a:pPr algn="ctr"/>
+            <a:r>
+              <a:rPr lang="en-US" altLang="ja-JP" sz="1400" dirty="0" smtClean="0">
+                <a:solidFill>
+                  <a:srgbClr val="404040"/>
+                </a:solidFill>
+                <a:effectLst/>
+              </a:rPr>
+              <a:t>Interceptor</a:t>
+            </a:r>
+            <a:endParaRPr kumimoji="1" lang="ja-JP" altLang="en-US" sz="1400" dirty="0">
+              <a:solidFill>
+                <a:srgbClr val="404040"/>
+              </a:solidFill>
+            </a:endParaRPr>
+          </a:p>
+        </p:txBody>
+      </p:sp>
+    </p:spTree>
+    <p:extLst>
+      <p:ext uri="{BB962C8B-B14F-4D97-AF65-F5344CB8AC3E}">
+        <p14:creationId xmlns:p14="http://schemas.microsoft.com/office/powerpoint/2010/main" val="3201804174"/>
       </p:ext>
     </p:extLst>
   </p:cSld>

</xml_diff>

<commit_message>
Improve a illustration of JDK
</commit_message>
<xml_diff>
--- a/images/material.pptx
+++ b/images/material.pptx
@@ -5708,7 +5708,7 @@
         <p:spPr>
           <a:xfrm>
             <a:off x="1802188" y="168093"/>
-            <a:ext cx="8290748" cy="7422732"/>
+            <a:ext cx="8290748" cy="6439266"/>
           </a:xfrm>
           <a:prstGeom prst="rect">
             <a:avLst/>
@@ -5738,7 +5738,7 @@
           </a:fontRef>
         </p:style>
         <p:txBody>
-          <a:bodyPr rtlCol="0" anchor="b" anchorCtr="0"/>
+          <a:bodyPr rtlCol="0" anchor="t" anchorCtr="0"/>
           <a:lstStyle/>
           <a:p>
             <a:pPr algn="ctr"/>
@@ -6030,7 +6030,7 @@
         </p:nvSpPr>
         <p:spPr>
           <a:xfrm>
-            <a:off x="3847154" y="3337162"/>
+            <a:off x="3837816" y="3253111"/>
             <a:ext cx="5914958" cy="2708214"/>
           </a:xfrm>
           <a:prstGeom prst="rect">
@@ -6072,7 +6072,7 @@
         </p:nvSpPr>
         <p:spPr>
           <a:xfrm>
-            <a:off x="8243637" y="4952773"/>
+            <a:off x="8234299" y="4868722"/>
             <a:ext cx="1316625" cy="877811"/>
           </a:xfrm>
           <a:prstGeom prst="rect">
@@ -6178,7 +6178,7 @@
         </p:nvSpPr>
         <p:spPr>
           <a:xfrm>
-            <a:off x="4286027" y="4121227"/>
+            <a:off x="4276689" y="4037176"/>
             <a:ext cx="3387995" cy="1486477"/>
           </a:xfrm>
           <a:prstGeom prst="rect">
@@ -6234,7 +6234,7 @@
         </p:nvSpPr>
         <p:spPr>
           <a:xfrm>
-            <a:off x="4601911" y="4535857"/>
+            <a:off x="4592573" y="4451806"/>
             <a:ext cx="1325961" cy="938703"/>
           </a:xfrm>
           <a:prstGeom prst="rect">
@@ -6321,7 +6321,7 @@
         </p:nvSpPr>
         <p:spPr>
           <a:xfrm>
-            <a:off x="8234299" y="3831736"/>
+            <a:off x="8224961" y="3747685"/>
             <a:ext cx="1335297" cy="784439"/>
           </a:xfrm>
           <a:prstGeom prst="rect">
@@ -6422,7 +6422,7 @@
         </p:nvCxnSpPr>
         <p:spPr>
           <a:xfrm flipH="1" flipV="1">
-            <a:off x="8901948" y="4616175"/>
+            <a:off x="8892610" y="4532124"/>
             <a:ext cx="2" cy="336598"/>
           </a:xfrm>
           <a:prstGeom prst="straightConnector1">
@@ -6505,13 +6505,13 @@
         </p:nvCxnSpPr>
         <p:spPr>
           <a:xfrm rot="5400000">
-            <a:off x="3354870" y="3204960"/>
-            <a:ext cx="2590664" cy="728349"/>
+            <a:off x="3392227" y="3158265"/>
+            <a:ext cx="2506613" cy="737687"/>
           </a:xfrm>
           <a:prstGeom prst="bentConnector4">
             <a:avLst>
-              <a:gd name="adj1" fmla="val 35655"/>
-              <a:gd name="adj2" fmla="val 131386"/>
+              <a:gd name="adj1" fmla="val 26605"/>
+              <a:gd name="adj2" fmla="val 205672"/>
             </a:avLst>
           </a:prstGeom>
           <a:ln w="38100">
@@ -6550,7 +6550,7 @@
         </p:nvCxnSpPr>
         <p:spPr>
           <a:xfrm flipV="1">
-            <a:off x="7695695" y="4223956"/>
+            <a:off x="7686357" y="4139905"/>
             <a:ext cx="538604" cy="611867"/>
           </a:xfrm>
           <a:prstGeom prst="straightConnector1">
@@ -7429,7 +7429,7 @@
         </p:nvSpPr>
         <p:spPr>
           <a:xfrm>
-            <a:off x="6182978" y="4540704"/>
+            <a:off x="6173640" y="4456653"/>
             <a:ext cx="1325961" cy="933856"/>
           </a:xfrm>
           <a:prstGeom prst="rect">
@@ -7515,6 +7515,79 @@
             <a:endParaRPr kumimoji="1" lang="ja-JP" altLang="en-US" sz="1400" dirty="0">
               <a:solidFill>
                 <a:srgbClr val="404040"/>
+              </a:solidFill>
+            </a:endParaRPr>
+          </a:p>
+        </p:txBody>
+      </p:sp>
+      <p:sp>
+        <p:nvSpPr>
+          <p:cNvPr id="46" name="正方形/長方形 45"/>
+          <p:cNvSpPr/>
+          <p:nvPr/>
+        </p:nvSpPr>
+        <p:spPr>
+          <a:xfrm>
+            <a:off x="1776092" y="6881844"/>
+            <a:ext cx="8316843" cy="708980"/>
+          </a:xfrm>
+          <a:prstGeom prst="rect">
+            <a:avLst/>
+          </a:prstGeom>
+          <a:solidFill>
+            <a:schemeClr val="accent2">
+              <a:lumMod val="20000"/>
+              <a:lumOff val="80000"/>
+            </a:schemeClr>
+          </a:solidFill>
+          <a:ln w="38100" cmpd="dbl">
+            <a:noFill/>
+            <a:prstDash val="solid"/>
+          </a:ln>
+        </p:spPr>
+        <p:style>
+          <a:lnRef idx="2">
+            <a:schemeClr val="accent3">
+              <a:shade val="50000"/>
+            </a:schemeClr>
+          </a:lnRef>
+          <a:fillRef idx="1">
+            <a:schemeClr val="accent3"/>
+          </a:fillRef>
+          <a:effectRef idx="0">
+            <a:schemeClr val="accent3"/>
+          </a:effectRef>
+          <a:fontRef idx="minor">
+            <a:schemeClr val="lt1"/>
+          </a:fontRef>
+        </p:style>
+        <p:txBody>
+          <a:bodyPr rtlCol="0" anchor="ctr" anchorCtr="0"/>
+          <a:lstStyle/>
+          <a:p>
+            <a:pPr algn="ctr"/>
+            <a:r>
+              <a:rPr lang="en-US" altLang="ja-JP" sz="2400" dirty="0" smtClean="0">
+                <a:solidFill>
+                  <a:schemeClr val="accent2"/>
+                </a:solidFill>
+              </a:rPr>
+              <a:t>Servlet </a:t>
+            </a:r>
+          </a:p>
+          <a:p>
+            <a:pPr algn="ctr"/>
+            <a:r>
+              <a:rPr lang="en-US" altLang="ja-JP" sz="2400" dirty="0" smtClean="0">
+                <a:solidFill>
+                  <a:schemeClr val="accent2"/>
+                </a:solidFill>
+              </a:rPr>
+              <a:t>Container</a:t>
+            </a:r>
+            <a:endParaRPr kumimoji="1" lang="en-US" altLang="ja-JP" sz="2400" dirty="0" smtClean="0">
+              <a:solidFill>
+                <a:schemeClr val="accent2"/>
               </a:solidFill>
             </a:endParaRPr>
           </a:p>

</xml_diff>

<commit_message>
Update readme.md (Update to CXF 3.1.0)
</commit_message>
<xml_diff>
--- a/images/material.pptx
+++ b/images/material.pptx
@@ -289,7 +289,7 @@
           <a:p>
             <a:fld id="{62E7979B-FB14-BC43-8173-40591443F091}" type="datetimeFigureOut">
               <a:rPr kumimoji="1" lang="ja-JP" altLang="en-US" smtClean="0"/>
-              <a:t>15/05/30</a:t>
+              <a:t>15/06/03</a:t>
             </a:fld>
             <a:endParaRPr kumimoji="1" lang="ja-JP" altLang="en-US"/>
           </a:p>
@@ -491,7 +491,7 @@
           <a:p>
             <a:fld id="{62E7979B-FB14-BC43-8173-40591443F091}" type="datetimeFigureOut">
               <a:rPr kumimoji="1" lang="ja-JP" altLang="en-US" smtClean="0"/>
-              <a:t>15/05/30</a:t>
+              <a:t>15/06/03</a:t>
             </a:fld>
             <a:endParaRPr kumimoji="1" lang="ja-JP" altLang="en-US"/>
           </a:p>
@@ -703,7 +703,7 @@
           <a:p>
             <a:fld id="{62E7979B-FB14-BC43-8173-40591443F091}" type="datetimeFigureOut">
               <a:rPr kumimoji="1" lang="ja-JP" altLang="en-US" smtClean="0"/>
-              <a:t>15/05/30</a:t>
+              <a:t>15/06/03</a:t>
             </a:fld>
             <a:endParaRPr kumimoji="1" lang="ja-JP" altLang="en-US"/>
           </a:p>
@@ -905,7 +905,7 @@
           <a:p>
             <a:fld id="{62E7979B-FB14-BC43-8173-40591443F091}" type="datetimeFigureOut">
               <a:rPr kumimoji="1" lang="ja-JP" altLang="en-US" smtClean="0"/>
-              <a:t>15/05/30</a:t>
+              <a:t>15/06/03</a:t>
             </a:fld>
             <a:endParaRPr kumimoji="1" lang="ja-JP" altLang="en-US"/>
           </a:p>
@@ -1151,7 +1151,7 @@
           <a:p>
             <a:fld id="{62E7979B-FB14-BC43-8173-40591443F091}" type="datetimeFigureOut">
               <a:rPr kumimoji="1" lang="ja-JP" altLang="en-US" smtClean="0"/>
-              <a:t>15/05/30</a:t>
+              <a:t>15/06/03</a:t>
             </a:fld>
             <a:endParaRPr kumimoji="1" lang="ja-JP" altLang="en-US"/>
           </a:p>
@@ -1503,7 +1503,7 @@
           <a:p>
             <a:fld id="{62E7979B-FB14-BC43-8173-40591443F091}" type="datetimeFigureOut">
               <a:rPr kumimoji="1" lang="ja-JP" altLang="en-US" smtClean="0"/>
-              <a:t>15/05/30</a:t>
+              <a:t>15/06/03</a:t>
             </a:fld>
             <a:endParaRPr kumimoji="1" lang="ja-JP" altLang="en-US"/>
           </a:p>
@@ -1989,7 +1989,7 @@
           <a:p>
             <a:fld id="{62E7979B-FB14-BC43-8173-40591443F091}" type="datetimeFigureOut">
               <a:rPr kumimoji="1" lang="ja-JP" altLang="en-US" smtClean="0"/>
-              <a:t>15/05/30</a:t>
+              <a:t>15/06/03</a:t>
             </a:fld>
             <a:endParaRPr kumimoji="1" lang="ja-JP" altLang="en-US"/>
           </a:p>
@@ -2107,7 +2107,7 @@
           <a:p>
             <a:fld id="{62E7979B-FB14-BC43-8173-40591443F091}" type="datetimeFigureOut">
               <a:rPr kumimoji="1" lang="ja-JP" altLang="en-US" smtClean="0"/>
-              <a:t>15/05/30</a:t>
+              <a:t>15/06/03</a:t>
             </a:fld>
             <a:endParaRPr kumimoji="1" lang="ja-JP" altLang="en-US"/>
           </a:p>
@@ -2202,7 +2202,7 @@
           <a:p>
             <a:fld id="{62E7979B-FB14-BC43-8173-40591443F091}" type="datetimeFigureOut">
               <a:rPr kumimoji="1" lang="ja-JP" altLang="en-US" smtClean="0"/>
-              <a:t>15/05/30</a:t>
+              <a:t>15/06/03</a:t>
             </a:fld>
             <a:endParaRPr kumimoji="1" lang="ja-JP" altLang="en-US"/>
           </a:p>
@@ -2511,7 +2511,7 @@
           <a:p>
             <a:fld id="{62E7979B-FB14-BC43-8173-40591443F091}" type="datetimeFigureOut">
               <a:rPr kumimoji="1" lang="ja-JP" altLang="en-US" smtClean="0"/>
-              <a:t>15/05/30</a:t>
+              <a:t>15/06/03</a:t>
             </a:fld>
             <a:endParaRPr kumimoji="1" lang="ja-JP" altLang="en-US"/>
           </a:p>
@@ -2764,7 +2764,7 @@
           <a:p>
             <a:fld id="{62E7979B-FB14-BC43-8173-40591443F091}" type="datetimeFigureOut">
               <a:rPr kumimoji="1" lang="ja-JP" altLang="en-US" smtClean="0"/>
-              <a:t>15/05/30</a:t>
+              <a:t>15/06/03</a:t>
             </a:fld>
             <a:endParaRPr kumimoji="1" lang="ja-JP" altLang="en-US"/>
           </a:p>
@@ -3009,7 +3009,7 @@
           <a:p>
             <a:fld id="{62E7979B-FB14-BC43-8173-40591443F091}" type="datetimeFigureOut">
               <a:rPr kumimoji="1" lang="ja-JP" altLang="en-US" smtClean="0"/>
-              <a:t>15/05/30</a:t>
+              <a:t>15/06/03</a:t>
             </a:fld>
             <a:endParaRPr kumimoji="1" lang="ja-JP" altLang="en-US"/>
           </a:p>
@@ -3966,12 +3966,25 @@
             <a:pPr algn="ctr"/>
             <a:r>
               <a:rPr kumimoji="1" lang="en-US" altLang="ja-JP" dirty="0" smtClean="0"/>
-              <a:t>Apache </a:t>
+              <a:t>Apache CXF </a:t>
             </a:r>
             <a:r>
               <a:rPr kumimoji="1" lang="en-US" altLang="ja-JP" dirty="0" smtClean="0"/>
-              <a:t>CXF 3.0.5</a:t>
-            </a:r>
+              <a:t>3.</a:t>
+            </a:r>
+            <a:r>
+              <a:rPr kumimoji="1" lang="en-US" altLang="ja-JP" dirty="0" smtClean="0"/>
+              <a:t>1</a:t>
+            </a:r>
+            <a:r>
+              <a:rPr kumimoji="1" lang="en-US" altLang="ja-JP" dirty="0" smtClean="0"/>
+              <a:t>.</a:t>
+            </a:r>
+            <a:r>
+              <a:rPr kumimoji="1" lang="en-US" altLang="ja-JP" dirty="0" smtClean="0"/>
+              <a:t>0</a:t>
+            </a:r>
+            <a:endParaRPr kumimoji="1" lang="en-US" altLang="ja-JP" dirty="0" smtClean="0"/>
           </a:p>
           <a:p>
             <a:pPr algn="ctr"/>
@@ -7863,15 +7876,7 @@
                   <a:schemeClr val="accent2"/>
                 </a:solidFill>
               </a:rPr>
-              <a:t>Servlet </a:t>
-            </a:r>
-            <a:r>
-              <a:rPr lang="en-US" altLang="ja-JP" sz="2400" dirty="0" smtClean="0">
-                <a:solidFill>
-                  <a:schemeClr val="accent2"/>
-                </a:solidFill>
-              </a:rPr>
-              <a:t>Container</a:t>
+              <a:t>Servlet Container</a:t>
             </a:r>
             <a:endParaRPr kumimoji="1" lang="en-US" altLang="ja-JP" sz="2400" dirty="0" smtClean="0">
               <a:solidFill>

</xml_diff>